<commit_message>
Added Unit Tests to MVC Project
</commit_message>
<xml_diff>
--- a/Presentation/UnitTesting.pptx
+++ b/Presentation/UnitTesting.pptx
@@ -5,7 +5,7 @@
     <p:sldMasterId id="2147483660" r:id="rId1"/>
   </p:sldMasterIdLst>
   <p:notesMasterIdLst>
-    <p:notesMasterId r:id="rId20"/>
+    <p:notesMasterId r:id="rId21"/>
   </p:notesMasterIdLst>
   <p:sldIdLst>
     <p:sldId id="256" r:id="rId2"/>
@@ -17,15 +17,16 @@
     <p:sldId id="268" r:id="rId8"/>
     <p:sldId id="260" r:id="rId9"/>
     <p:sldId id="266" r:id="rId10"/>
-    <p:sldId id="269" r:id="rId11"/>
-    <p:sldId id="270" r:id="rId12"/>
-    <p:sldId id="272" r:id="rId13"/>
-    <p:sldId id="271" r:id="rId14"/>
-    <p:sldId id="262" r:id="rId15"/>
-    <p:sldId id="264" r:id="rId16"/>
-    <p:sldId id="265" r:id="rId17"/>
-    <p:sldId id="273" r:id="rId18"/>
-    <p:sldId id="263" r:id="rId19"/>
+    <p:sldId id="274" r:id="rId11"/>
+    <p:sldId id="269" r:id="rId12"/>
+    <p:sldId id="270" r:id="rId13"/>
+    <p:sldId id="272" r:id="rId14"/>
+    <p:sldId id="271" r:id="rId15"/>
+    <p:sldId id="262" r:id="rId16"/>
+    <p:sldId id="264" r:id="rId17"/>
+    <p:sldId id="265" r:id="rId18"/>
+    <p:sldId id="273" r:id="rId19"/>
+    <p:sldId id="263" r:id="rId20"/>
   </p:sldIdLst>
   <p:sldSz cx="12192000" cy="6858000"/>
   <p:notesSz cx="6858000" cy="9144000"/>
@@ -214,7 +215,7 @@
           <a:p>
             <a:fld id="{69D08B4B-3D81-45B6-B05D-50B4FAF5501B}" type="datetimeFigureOut">
               <a:rPr lang="en-US" smtClean="0"/>
-              <a:t>4/25/2017</a:t>
+              <a:t>4/26/2017</a:t>
             </a:fld>
             <a:endParaRPr lang="en-US"/>
           </a:p>
@@ -620,7 +621,15 @@
           <a:p>
             <a:r>
               <a:rPr lang="en-US" dirty="0"/>
-              <a:t>ARRANGE - creates the conditions necessary to run a test. </a:t>
+              <a:t>ARRANGE - creates the conditions necessary to run a test. Setup objects, Variables </a:t>
+            </a:r>
+            <a:r>
+              <a:rPr lang="en-US" dirty="0" err="1"/>
+              <a:t>etc</a:t>
+            </a:r>
+            <a:r>
+              <a:rPr lang="en-US" dirty="0"/>
+              <a:t>…. </a:t>
             </a:r>
           </a:p>
           <a:p>
@@ -1010,6 +1019,90 @@
     <p:extLst>
       <p:ext uri="{BB962C8B-B14F-4D97-AF65-F5344CB8AC3E}">
         <p14:creationId xmlns:p14="http://schemas.microsoft.com/office/powerpoint/2010/main" val="1272690924"/>
+      </p:ext>
+    </p:extLst>
+  </p:cSld>
+  <p:clrMapOvr>
+    <a:masterClrMapping/>
+  </p:clrMapOvr>
+</p:notes>
+</file>
+
+<file path=ppt/notesSlides/notesSlide5.xml><?xml version="1.0" encoding="utf-8"?>
+<p:notes xmlns:a="http://schemas.openxmlformats.org/drawingml/2006/main" xmlns:r="http://schemas.openxmlformats.org/officeDocument/2006/relationships" xmlns:p="http://schemas.openxmlformats.org/presentationml/2006/main">
+  <p:cSld>
+    <p:spTree>
+      <p:nvGrpSpPr>
+        <p:cNvPr id="1" name=""/>
+        <p:cNvGrpSpPr/>
+        <p:nvPr/>
+      </p:nvGrpSpPr>
+      <p:grpSpPr>
+        <a:xfrm>
+          <a:off x="0" y="0"/>
+          <a:ext cx="0" cy="0"/>
+          <a:chOff x="0" y="0"/>
+          <a:chExt cx="0" cy="0"/>
+        </a:xfrm>
+      </p:grpSpPr>
+      <p:sp>
+        <p:nvSpPr>
+          <p:cNvPr id="2" name="Slide Image Placeholder 1"/>
+          <p:cNvSpPr>
+            <a:spLocks noGrp="1" noRot="1" noChangeAspect="1"/>
+          </p:cNvSpPr>
+          <p:nvPr>
+            <p:ph type="sldImg"/>
+          </p:nvPr>
+        </p:nvSpPr>
+        <p:spPr/>
+      </p:sp>
+      <p:sp>
+        <p:nvSpPr>
+          <p:cNvPr id="3" name="Notes Placeholder 2"/>
+          <p:cNvSpPr>
+            <a:spLocks noGrp="1"/>
+          </p:cNvSpPr>
+          <p:nvPr>
+            <p:ph type="body" idx="1"/>
+          </p:nvPr>
+        </p:nvSpPr>
+        <p:spPr/>
+        <p:txBody>
+          <a:bodyPr/>
+          <a:lstStyle/>
+          <a:p>
+            <a:endParaRPr lang="en-US" dirty="0"/>
+          </a:p>
+        </p:txBody>
+      </p:sp>
+      <p:sp>
+        <p:nvSpPr>
+          <p:cNvPr id="4" name="Slide Number Placeholder 3"/>
+          <p:cNvSpPr>
+            <a:spLocks noGrp="1"/>
+          </p:cNvSpPr>
+          <p:nvPr>
+            <p:ph type="sldNum" sz="quarter" idx="10"/>
+          </p:nvPr>
+        </p:nvSpPr>
+        <p:spPr/>
+        <p:txBody>
+          <a:bodyPr/>
+          <a:lstStyle/>
+          <a:p>
+            <a:fld id="{5270D8FF-7B73-4776-AB67-BDBD3DDB0E26}" type="slidenum">
+              <a:rPr lang="en-US" smtClean="0"/>
+              <a:t>14</a:t>
+            </a:fld>
+            <a:endParaRPr lang="en-US"/>
+          </a:p>
+        </p:txBody>
+      </p:sp>
+    </p:spTree>
+    <p:extLst>
+      <p:ext uri="{BB962C8B-B14F-4D97-AF65-F5344CB8AC3E}">
+        <p14:creationId xmlns:p14="http://schemas.microsoft.com/office/powerpoint/2010/main" val="3389327606"/>
       </p:ext>
     </p:extLst>
   </p:cSld>
@@ -1158,7 +1251,7 @@
           <a:p>
             <a:fld id="{F36E7964-2CFC-45F1-90FA-1E9DE5A8C0BF}" type="datetimeFigureOut">
               <a:rPr lang="en-US" smtClean="0"/>
-              <a:t>4/25/2017</a:t>
+              <a:t>4/26/2017</a:t>
             </a:fld>
             <a:endParaRPr lang="en-US"/>
           </a:p>
@@ -1369,7 +1462,7 @@
           <a:p>
             <a:fld id="{F36E7964-2CFC-45F1-90FA-1E9DE5A8C0BF}" type="datetimeFigureOut">
               <a:rPr lang="en-US" smtClean="0"/>
-              <a:t>4/25/2017</a:t>
+              <a:t>4/26/2017</a:t>
             </a:fld>
             <a:endParaRPr lang="en-US"/>
           </a:p>
@@ -1584,7 +1677,7 @@
           <a:p>
             <a:fld id="{F36E7964-2CFC-45F1-90FA-1E9DE5A8C0BF}" type="datetimeFigureOut">
               <a:rPr lang="en-US" smtClean="0"/>
-              <a:t>4/25/2017</a:t>
+              <a:t>4/26/2017</a:t>
             </a:fld>
             <a:endParaRPr lang="en-US"/>
           </a:p>
@@ -1785,7 +1878,7 @@
           <a:p>
             <a:fld id="{F36E7964-2CFC-45F1-90FA-1E9DE5A8C0BF}" type="datetimeFigureOut">
               <a:rPr lang="en-US" smtClean="0"/>
-              <a:t>4/25/2017</a:t>
+              <a:t>4/26/2017</a:t>
             </a:fld>
             <a:endParaRPr lang="en-US"/>
           </a:p>
@@ -2064,7 +2157,7 @@
           <a:p>
             <a:fld id="{F36E7964-2CFC-45F1-90FA-1E9DE5A8C0BF}" type="datetimeFigureOut">
               <a:rPr lang="en-US" smtClean="0"/>
-              <a:t>4/25/2017</a:t>
+              <a:t>4/26/2017</a:t>
             </a:fld>
             <a:endParaRPr lang="en-US"/>
           </a:p>
@@ -2332,7 +2425,7 @@
           <a:p>
             <a:fld id="{F36E7964-2CFC-45F1-90FA-1E9DE5A8C0BF}" type="datetimeFigureOut">
               <a:rPr lang="en-US" smtClean="0"/>
-              <a:t>4/25/2017</a:t>
+              <a:t>4/26/2017</a:t>
             </a:fld>
             <a:endParaRPr lang="en-US"/>
           </a:p>
@@ -2748,7 +2841,7 @@
           <a:p>
             <a:fld id="{F36E7964-2CFC-45F1-90FA-1E9DE5A8C0BF}" type="datetimeFigureOut">
               <a:rPr lang="en-US" smtClean="0"/>
-              <a:t>4/25/2017</a:t>
+              <a:t>4/26/2017</a:t>
             </a:fld>
             <a:endParaRPr lang="en-US"/>
           </a:p>
@@ -2897,7 +2990,7 @@
           <a:p>
             <a:fld id="{F36E7964-2CFC-45F1-90FA-1E9DE5A8C0BF}" type="datetimeFigureOut">
               <a:rPr lang="en-US" smtClean="0"/>
-              <a:t>4/25/2017</a:t>
+              <a:t>4/26/2017</a:t>
             </a:fld>
             <a:endParaRPr lang="en-US"/>
           </a:p>
@@ -3023,7 +3116,7 @@
           <a:p>
             <a:fld id="{F36E7964-2CFC-45F1-90FA-1E9DE5A8C0BF}" type="datetimeFigureOut">
               <a:rPr lang="en-US" smtClean="0"/>
-              <a:t>4/25/2017</a:t>
+              <a:t>4/26/2017</a:t>
             </a:fld>
             <a:endParaRPr lang="en-US"/>
           </a:p>
@@ -3274,7 +3367,7 @@
           <a:p>
             <a:fld id="{F36E7964-2CFC-45F1-90FA-1E9DE5A8C0BF}" type="datetimeFigureOut">
               <a:rPr lang="en-US" smtClean="0"/>
-              <a:t>4/25/2017</a:t>
+              <a:t>4/26/2017</a:t>
             </a:fld>
             <a:endParaRPr lang="en-US"/>
           </a:p>
@@ -3719,7 +3812,7 @@
           <a:p>
             <a:fld id="{F36E7964-2CFC-45F1-90FA-1E9DE5A8C0BF}" type="datetimeFigureOut">
               <a:rPr lang="en-US" smtClean="0"/>
-              <a:t>4/25/2017</a:t>
+              <a:t>4/26/2017</a:t>
             </a:fld>
             <a:endParaRPr lang="en-US"/>
           </a:p>
@@ -4045,7 +4138,7 @@
           <a:p>
             <a:fld id="{F36E7964-2CFC-45F1-90FA-1E9DE5A8C0BF}" type="datetimeFigureOut">
               <a:rPr lang="en-US" smtClean="0"/>
-              <a:t>4/25/2017</a:t>
+              <a:t>4/26/2017</a:t>
             </a:fld>
             <a:endParaRPr lang="en-US"/>
           </a:p>
@@ -4644,49 +4737,31 @@
           <a:p>
             <a:r>
               <a:rPr lang="en-US" dirty="0"/>
-              <a:t>Virtually all code bases</a:t>
-            </a:r>
-          </a:p>
-          <a:p>
-            <a:pPr lvl="1"/>
-            <a:r>
-              <a:rPr lang="en-US" dirty="0"/>
-              <a:t>.NET</a:t>
-            </a:r>
-          </a:p>
-          <a:p>
-            <a:pPr lvl="1"/>
-            <a:r>
-              <a:rPr lang="en-US" dirty="0"/>
-              <a:t>MVC</a:t>
-            </a:r>
-          </a:p>
-          <a:p>
-            <a:pPr lvl="1"/>
-            <a:r>
-              <a:rPr lang="en-US" dirty="0"/>
-              <a:t>Console Apps</a:t>
-            </a:r>
-          </a:p>
-          <a:p>
-            <a:pPr lvl="1"/>
-            <a:r>
-              <a:rPr lang="en-US" dirty="0"/>
-              <a:t>DLL’s</a:t>
-            </a:r>
-          </a:p>
-          <a:p>
-            <a:pPr lvl="1"/>
-            <a:r>
-              <a:rPr lang="en-US" dirty="0"/>
-              <a:t>JavaScript Front-Ends</a:t>
-            </a:r>
-          </a:p>
-          <a:p>
-            <a:pPr lvl="1"/>
-            <a:r>
-              <a:rPr lang="en-US" dirty="0"/>
-              <a:t>Mobile Apps</a:t>
+              <a:t>Business Logic</a:t>
+            </a:r>
+          </a:p>
+          <a:p>
+            <a:r>
+              <a:rPr lang="en-US" dirty="0"/>
+              <a:t>Data Transformation Logic</a:t>
+            </a:r>
+          </a:p>
+          <a:p>
+            <a:r>
+              <a:rPr lang="en-US" dirty="0"/>
+              <a:t>Presentation Logic</a:t>
+            </a:r>
+          </a:p>
+          <a:p>
+            <a:r>
+              <a:rPr lang="en-US" dirty="0"/>
+              <a:t>User Interaction Logic</a:t>
+            </a:r>
+          </a:p>
+          <a:p>
+            <a:r>
+              <a:rPr lang="en-US" dirty="0"/>
+              <a:t>Database Logic</a:t>
             </a:r>
           </a:p>
         </p:txBody>
@@ -4694,7 +4769,7 @@
     </p:spTree>
     <p:extLst>
       <p:ext uri="{BB962C8B-B14F-4D97-AF65-F5344CB8AC3E}">
-        <p14:creationId xmlns:p14="http://schemas.microsoft.com/office/powerpoint/2010/main" val="818327794"/>
+        <p14:creationId xmlns:p14="http://schemas.microsoft.com/office/powerpoint/2010/main" val="16984105"/>
       </p:ext>
     </p:extLst>
   </p:cSld>
@@ -4738,7 +4813,7 @@
           <a:p>
             <a:r>
               <a:rPr lang="en-US" dirty="0"/>
-              <a:t>Unit Testing Tools</a:t>
+              <a:t>What Can You Unit Test</a:t>
             </a:r>
           </a:p>
         </p:txBody>
@@ -4760,49 +4835,49 @@
           <a:p>
             <a:r>
               <a:rPr lang="en-US" dirty="0"/>
-              <a:t>Visual Studio</a:t>
-            </a:r>
-          </a:p>
-          <a:p>
-            <a:r>
-              <a:rPr lang="en-US" dirty="0"/>
-              <a:t>JavaScript – </a:t>
-            </a:r>
-            <a:r>
-              <a:rPr lang="en-US" dirty="0" err="1"/>
-              <a:t>Qunit</a:t>
-            </a:r>
-            <a:endParaRPr lang="en-US" dirty="0"/>
-          </a:p>
-          <a:p>
-            <a:r>
-              <a:rPr lang="en-US" dirty="0"/>
-              <a:t>Java - Junit</a:t>
-            </a:r>
-          </a:p>
-          <a:p>
-            <a:r>
-              <a:rPr lang="en-US" dirty="0"/>
-              <a:t>.NET - </a:t>
-            </a:r>
-            <a:r>
-              <a:rPr lang="en-US" dirty="0" err="1"/>
-              <a:t>Nunit</a:t>
-            </a:r>
-            <a:endParaRPr lang="en-US" dirty="0"/>
-          </a:p>
-          <a:p>
-            <a:r>
-              <a:rPr lang="en-US" dirty="0"/>
-              <a:t>Many </a:t>
-            </a:r>
-            <a:r>
-              <a:rPr lang="en-US" dirty="0" err="1"/>
-              <a:t>Many</a:t>
-            </a:r>
-            <a:r>
-              <a:rPr lang="en-US" dirty="0"/>
-              <a:t> More</a:t>
+              <a:t>Virtually all code bases</a:t>
+            </a:r>
+          </a:p>
+          <a:p>
+            <a:pPr lvl="1"/>
+            <a:r>
+              <a:rPr lang="en-US" dirty="0"/>
+              <a:t>.NET</a:t>
+            </a:r>
+          </a:p>
+          <a:p>
+            <a:pPr lvl="1"/>
+            <a:r>
+              <a:rPr lang="en-US" dirty="0"/>
+              <a:t>MVC</a:t>
+            </a:r>
+          </a:p>
+          <a:p>
+            <a:pPr lvl="1"/>
+            <a:r>
+              <a:rPr lang="en-US" dirty="0"/>
+              <a:t>Console Apps</a:t>
+            </a:r>
+          </a:p>
+          <a:p>
+            <a:pPr lvl="1"/>
+            <a:r>
+              <a:rPr lang="en-US" dirty="0"/>
+              <a:t>DLL’s</a:t>
+            </a:r>
+          </a:p>
+          <a:p>
+            <a:pPr lvl="1"/>
+            <a:r>
+              <a:rPr lang="en-US" dirty="0"/>
+              <a:t>JavaScript Front-Ends</a:t>
+            </a:r>
+          </a:p>
+          <a:p>
+            <a:pPr lvl="1"/>
+            <a:r>
+              <a:rPr lang="en-US" dirty="0"/>
+              <a:t>Mobile Apps</a:t>
             </a:r>
           </a:p>
         </p:txBody>
@@ -4810,7 +4885,7 @@
     </p:spTree>
     <p:extLst>
       <p:ext uri="{BB962C8B-B14F-4D97-AF65-F5344CB8AC3E}">
-        <p14:creationId xmlns:p14="http://schemas.microsoft.com/office/powerpoint/2010/main" val="420624657"/>
+        <p14:creationId xmlns:p14="http://schemas.microsoft.com/office/powerpoint/2010/main" val="818327794"/>
       </p:ext>
     </p:extLst>
   </p:cSld>
@@ -4854,7 +4929,7 @@
           <a:p>
             <a:r>
               <a:rPr lang="en-US" dirty="0"/>
-              <a:t>Design For Unit Testing</a:t>
+              <a:t>Unit Testing Tools</a:t>
             </a:r>
           </a:p>
         </p:txBody>
@@ -4876,18 +4951,57 @@
           <a:p>
             <a:r>
               <a:rPr lang="en-US" dirty="0"/>
-              <a:t>What if my code depends on other things (Email, Databases, Push Notification)? I have an object that calls other objects… then what?</a:t>
-            </a:r>
-          </a:p>
-          <a:p>
+              <a:t>Visual Studio</a:t>
+            </a:r>
+          </a:p>
+          <a:p>
+            <a:r>
+              <a:rPr lang="en-US" dirty="0"/>
+              <a:t>JavaScript – </a:t>
+            </a:r>
+            <a:r>
+              <a:rPr lang="en-US" dirty="0" err="1"/>
+              <a:t>Qunit</a:t>
+            </a:r>
             <a:endParaRPr lang="en-US" dirty="0"/>
+          </a:p>
+          <a:p>
+            <a:r>
+              <a:rPr lang="en-US" dirty="0"/>
+              <a:t>Java - Junit</a:t>
+            </a:r>
+          </a:p>
+          <a:p>
+            <a:r>
+              <a:rPr lang="en-US" dirty="0"/>
+              <a:t>.NET - </a:t>
+            </a:r>
+            <a:r>
+              <a:rPr lang="en-US" dirty="0" err="1"/>
+              <a:t>Nunit</a:t>
+            </a:r>
+            <a:endParaRPr lang="en-US" dirty="0"/>
+          </a:p>
+          <a:p>
+            <a:r>
+              <a:rPr lang="en-US" dirty="0"/>
+              <a:t>Many </a:t>
+            </a:r>
+            <a:r>
+              <a:rPr lang="en-US" dirty="0" err="1"/>
+              <a:t>Many</a:t>
+            </a:r>
+            <a:r>
+              <a:rPr lang="en-US" dirty="0"/>
+              <a:t> More</a:t>
+            </a:r>
           </a:p>
         </p:txBody>
       </p:sp>
     </p:spTree>
     <p:extLst>
       <p:ext uri="{BB962C8B-B14F-4D97-AF65-F5344CB8AC3E}">
-        <p14:creationId xmlns:p14="http://schemas.microsoft.com/office/powerpoint/2010/main" val="1322483234"/>
+        <p14:creationId xmlns:p14="http://schemas.microsoft.com/office/powerpoint/2010/main" val="420624657"/>
       </p:ext>
     </p:extLst>
   </p:cSld>
@@ -4953,27 +5067,7 @@
           <a:p>
             <a:r>
               <a:rPr lang="en-US" dirty="0"/>
-              <a:t>Dependency Injection</a:t>
-            </a:r>
-          </a:p>
-          <a:p>
-            <a:pPr lvl="1"/>
-            <a:r>
-              <a:rPr lang="en-US" dirty="0"/>
-              <a:t>Unity</a:t>
-            </a:r>
-          </a:p>
-          <a:p>
-            <a:pPr lvl="1"/>
-            <a:r>
-              <a:rPr lang="en-US" dirty="0"/>
-              <a:t>Rhino</a:t>
-            </a:r>
-          </a:p>
-          <a:p>
-            <a:r>
-              <a:rPr lang="en-US" dirty="0"/>
-              <a:t>Mocks vs Stubs</a:t>
+              <a:t>What if my code depends on other things (Email, Databases, Push Notification)? I have an object that calls other objects… then what?</a:t>
             </a:r>
           </a:p>
           <a:p>
@@ -4984,7 +5078,7 @@
     </p:spTree>
     <p:extLst>
       <p:ext uri="{BB962C8B-B14F-4D97-AF65-F5344CB8AC3E}">
-        <p14:creationId xmlns:p14="http://schemas.microsoft.com/office/powerpoint/2010/main" val="2746326609"/>
+        <p14:creationId xmlns:p14="http://schemas.microsoft.com/office/powerpoint/2010/main" val="1322483234"/>
       </p:ext>
     </p:extLst>
   </p:cSld>
@@ -5028,7 +5122,7 @@
           <a:p>
             <a:r>
               <a:rPr lang="en-US" dirty="0"/>
-              <a:t>Unit testing the User Interface</a:t>
+              <a:t>Design For Unit Testing</a:t>
             </a:r>
           </a:p>
         </p:txBody>
@@ -5050,15 +5144,38 @@
           <a:p>
             <a:r>
               <a:rPr lang="en-US" dirty="0"/>
-              <a:t>MVC Demo</a:t>
-            </a:r>
+              <a:t>Dependency Injection</a:t>
+            </a:r>
+          </a:p>
+          <a:p>
+            <a:pPr lvl="1"/>
+            <a:r>
+              <a:rPr lang="en-US" dirty="0"/>
+              <a:t>Unity</a:t>
+            </a:r>
+          </a:p>
+          <a:p>
+            <a:pPr lvl="1"/>
+            <a:r>
+              <a:rPr lang="en-US" dirty="0"/>
+              <a:t>Rhino</a:t>
+            </a:r>
+          </a:p>
+          <a:p>
+            <a:r>
+              <a:rPr lang="en-US" dirty="0"/>
+              <a:t>Mocks vs Stubs</a:t>
+            </a:r>
+          </a:p>
+          <a:p>
+            <a:endParaRPr lang="en-US" dirty="0"/>
           </a:p>
         </p:txBody>
       </p:sp>
     </p:spTree>
     <p:extLst>
       <p:ext uri="{BB962C8B-B14F-4D97-AF65-F5344CB8AC3E}">
-        <p14:creationId xmlns:p14="http://schemas.microsoft.com/office/powerpoint/2010/main" val="567081537"/>
+        <p14:creationId xmlns:p14="http://schemas.microsoft.com/office/powerpoint/2010/main" val="2746326609"/>
       </p:ext>
     </p:extLst>
   </p:cSld>
@@ -5102,7 +5219,7 @@
           <a:p>
             <a:r>
               <a:rPr lang="en-US" dirty="0"/>
-              <a:t>Unit Testing the Middle Tier</a:t>
+              <a:t>Unit testing the User Interface</a:t>
             </a:r>
           </a:p>
         </p:txBody>
@@ -5124,7 +5241,7 @@
           <a:p>
             <a:r>
               <a:rPr lang="en-US" dirty="0"/>
-              <a:t>Component Demo</a:t>
+              <a:t>MVC Demo</a:t>
             </a:r>
           </a:p>
         </p:txBody>
@@ -5132,7 +5249,7 @@
     </p:spTree>
     <p:extLst>
       <p:ext uri="{BB962C8B-B14F-4D97-AF65-F5344CB8AC3E}">
-        <p14:creationId xmlns:p14="http://schemas.microsoft.com/office/powerpoint/2010/main" val="4009361321"/>
+        <p14:creationId xmlns:p14="http://schemas.microsoft.com/office/powerpoint/2010/main" val="567081537"/>
       </p:ext>
     </p:extLst>
   </p:cSld>
@@ -5176,7 +5293,7 @@
           <a:p>
             <a:r>
               <a:rPr lang="en-US" dirty="0"/>
-              <a:t>Unit Testing the Data Layer</a:t>
+              <a:t>Unit Testing the Middle Tier</a:t>
             </a:r>
           </a:p>
         </p:txBody>
@@ -5198,7 +5315,7 @@
           <a:p>
             <a:r>
               <a:rPr lang="en-US" dirty="0"/>
-              <a:t>Data Access Demo w Repository Pattern</a:t>
+              <a:t>Component Demo</a:t>
             </a:r>
           </a:p>
         </p:txBody>
@@ -5206,7 +5323,7 @@
     </p:spTree>
     <p:extLst>
       <p:ext uri="{BB962C8B-B14F-4D97-AF65-F5344CB8AC3E}">
-        <p14:creationId xmlns:p14="http://schemas.microsoft.com/office/powerpoint/2010/main" val="1806368591"/>
+        <p14:creationId xmlns:p14="http://schemas.microsoft.com/office/powerpoint/2010/main" val="4009361321"/>
       </p:ext>
     </p:extLst>
   </p:cSld>
@@ -5250,6 +5367,80 @@
           <a:p>
             <a:r>
               <a:rPr lang="en-US" dirty="0"/>
+              <a:t>Unit Testing the Data Layer</a:t>
+            </a:r>
+          </a:p>
+        </p:txBody>
+      </p:sp>
+      <p:sp>
+        <p:nvSpPr>
+          <p:cNvPr id="3" name="Content Placeholder 2"/>
+          <p:cNvSpPr>
+            <a:spLocks noGrp="1"/>
+          </p:cNvSpPr>
+          <p:nvPr>
+            <p:ph idx="1"/>
+          </p:nvPr>
+        </p:nvSpPr>
+        <p:spPr/>
+        <p:txBody>
+          <a:bodyPr/>
+          <a:lstStyle/>
+          <a:p>
+            <a:r>
+              <a:rPr lang="en-US" dirty="0"/>
+              <a:t>Data Access Demo w Repository Pattern</a:t>
+            </a:r>
+          </a:p>
+        </p:txBody>
+      </p:sp>
+    </p:spTree>
+    <p:extLst>
+      <p:ext uri="{BB962C8B-B14F-4D97-AF65-F5344CB8AC3E}">
+        <p14:creationId xmlns:p14="http://schemas.microsoft.com/office/powerpoint/2010/main" val="1806368591"/>
+      </p:ext>
+    </p:extLst>
+  </p:cSld>
+  <p:clrMapOvr>
+    <a:masterClrMapping/>
+  </p:clrMapOvr>
+</p:sld>
+</file>
+
+<file path=ppt/slides/slide18.xml><?xml version="1.0" encoding="utf-8"?>
+<p:sld xmlns:a="http://schemas.openxmlformats.org/drawingml/2006/main" xmlns:r="http://schemas.openxmlformats.org/officeDocument/2006/relationships" xmlns:p="http://schemas.openxmlformats.org/presentationml/2006/main">
+  <p:cSld>
+    <p:spTree>
+      <p:nvGrpSpPr>
+        <p:cNvPr id="1" name=""/>
+        <p:cNvGrpSpPr/>
+        <p:nvPr/>
+      </p:nvGrpSpPr>
+      <p:grpSpPr>
+        <a:xfrm>
+          <a:off x="0" y="0"/>
+          <a:ext cx="0" cy="0"/>
+          <a:chOff x="0" y="0"/>
+          <a:chExt cx="0" cy="0"/>
+        </a:xfrm>
+      </p:grpSpPr>
+      <p:sp>
+        <p:nvSpPr>
+          <p:cNvPr id="2" name="Title 1"/>
+          <p:cNvSpPr>
+            <a:spLocks noGrp="1"/>
+          </p:cNvSpPr>
+          <p:nvPr>
+            <p:ph type="title"/>
+          </p:nvPr>
+        </p:nvSpPr>
+        <p:spPr/>
+        <p:txBody>
+          <a:bodyPr/>
+          <a:lstStyle/>
+          <a:p>
+            <a:r>
+              <a:rPr lang="en-US" dirty="0"/>
               <a:t>Automations</a:t>
             </a:r>
           </a:p>
@@ -5270,7 +5461,10 @@
           <a:bodyPr/>
           <a:lstStyle/>
           <a:p>
-            <a:endParaRPr lang="en-US"/>
+            <a:r>
+              <a:rPr lang="en-US" dirty="0"/>
+              <a:t>DEMO</a:t>
+            </a:r>
           </a:p>
         </p:txBody>
       </p:sp>
@@ -5287,7 +5481,7 @@
 </p:sld>
 </file>
 
-<file path=ppt/slides/slide18.xml><?xml version="1.0" encoding="utf-8"?>
+<file path=ppt/slides/slide19.xml><?xml version="1.0" encoding="utf-8"?>
 <p:sld xmlns:a="http://schemas.openxmlformats.org/drawingml/2006/main" xmlns:r="http://schemas.openxmlformats.org/officeDocument/2006/relationships" xmlns:p="http://schemas.openxmlformats.org/presentationml/2006/main">
   <p:cSld>
     <p:spTree>

</xml_diff>